<commit_message>
Update slide for scenarios
</commit_message>
<xml_diff>
--- a/docs/Presentations/Computer Vision Driving Aids Design Review.pptx
+++ b/docs/Presentations/Computer Vision Driving Aids Design Review.pptx
@@ -14870,13 +14870,110 @@
         </p:nvSpPr>
         <p:spPr/>
         <p:txBody>
-          <a:bodyPr/>
+          <a:bodyPr>
+            <a:normAutofit fontScale="85000" lnSpcReduction="20000"/>
+          </a:bodyPr>
           <a:lstStyle/>
           <a:p>
-            <a:endParaRPr lang="en-US"/>
+            <a:r>
+              <a:rPr lang="en-US" dirty="0"/>
+              <a:t>Normal Operation</a:t>
+            </a:r>
+          </a:p>
+          <a:p>
+            <a:pPr lvl="1"/>
+            <a:r>
+              <a:rPr lang="en-US" dirty="0"/>
+              <a:t>Launch Application</a:t>
+            </a:r>
+          </a:p>
+          <a:p>
+            <a:pPr lvl="1"/>
+            <a:r>
+              <a:rPr lang="en-US" dirty="0"/>
+              <a:t>Application monitors for lane departure</a:t>
+            </a:r>
+          </a:p>
+          <a:p>
+            <a:pPr lvl="1"/>
+            <a:r>
+              <a:rPr lang="en-US" dirty="0"/>
+              <a:t>User closes application at end of trip</a:t>
+            </a:r>
+          </a:p>
+          <a:p>
+            <a:r>
+              <a:rPr lang="en-US" dirty="0"/>
+              <a:t>Lane Departure Alert</a:t>
+            </a:r>
+          </a:p>
+          <a:p>
+            <a:pPr lvl="1"/>
+            <a:r>
+              <a:rPr lang="en-US" dirty="0"/>
+              <a:t>Launch Application</a:t>
+            </a:r>
+          </a:p>
+          <a:p>
+            <a:pPr lvl="1"/>
+            <a:r>
+              <a:rPr lang="en-US" dirty="0"/>
+              <a:t>Application monitors for lane departure</a:t>
+            </a:r>
+          </a:p>
+          <a:p>
+            <a:pPr lvl="1"/>
+            <a:r>
+              <a:rPr lang="en-US" dirty="0"/>
+              <a:t>Application detects lane departure</a:t>
+            </a:r>
+          </a:p>
+          <a:p>
+            <a:pPr lvl="1"/>
+            <a:r>
+              <a:rPr lang="en-US" dirty="0"/>
+              <a:t>Application triggers audio alert</a:t>
+            </a:r>
+          </a:p>
+          <a:p>
+            <a:pPr lvl="1"/>
+            <a:r>
+              <a:rPr lang="en-US" dirty="0"/>
+              <a:t>Application continues to monitor next lane departure</a:t>
+            </a:r>
           </a:p>
         </p:txBody>
       </p:sp>
+      <p:pic>
+        <p:nvPicPr>
+          <p:cNvPr id="3" name="Picture 2">
+            <a:extLst>
+              <a:ext uri="{FF2B5EF4-FFF2-40B4-BE49-F238E27FC236}">
+                <a16:creationId xmlns:a16="http://schemas.microsoft.com/office/drawing/2014/main" id="{7CE367AC-E73D-4AB5-9E52-A03194708013}"/>
+              </a:ext>
+            </a:extLst>
+          </p:cNvPr>
+          <p:cNvPicPr>
+            <a:picLocks noChangeAspect="1"/>
+          </p:cNvPicPr>
+          <p:nvPr/>
+        </p:nvPicPr>
+        <p:blipFill>
+          <a:blip r:embed="rId3"/>
+          <a:stretch>
+            <a:fillRect/>
+          </a:stretch>
+        </p:blipFill>
+        <p:spPr>
+          <a:xfrm>
+            <a:off x="6696635" y="1717823"/>
+            <a:ext cx="5314950" cy="4114800"/>
+          </a:xfrm>
+          <a:prstGeom prst="rect">
+            <a:avLst/>
+          </a:prstGeom>
+        </p:spPr>
+      </p:pic>
     </p:spTree>
     <p:extLst>
       <p:ext uri="{BB962C8B-B14F-4D97-AF65-F5344CB8AC3E}">

</xml_diff>

<commit_message>
Changed wording to reflect current project scope.
</commit_message>
<xml_diff>
--- a/docs/Presentations/Computer Vision Driving Aids Design Review.pptx
+++ b/docs/Presentations/Computer Vision Driving Aids Design Review.pptx
@@ -16,7 +16,7 @@
     <p:sldId id="270" r:id="rId7"/>
     <p:sldId id="264" r:id="rId8"/>
     <p:sldId id="265" r:id="rId9"/>
-    <p:sldId id="266" r:id="rId10"/>
+    <p:sldId id="271" r:id="rId10"/>
     <p:sldId id="262" r:id="rId11"/>
     <p:sldId id="267" r:id="rId12"/>
     <p:sldId id="268" r:id="rId13"/>
@@ -192,21 +192,6 @@
 </file>
 
 <file path=ppt/comments/comment4.xml><?xml version="1.0" encoding="utf-8"?>
-<p:cmLst xmlns:a="http://schemas.openxmlformats.org/drawingml/2006/main" xmlns:r="http://schemas.openxmlformats.org/officeDocument/2006/relationships" xmlns:p="http://schemas.openxmlformats.org/presentationml/2006/main">
-  <p:cm authorId="1" dt="2018-09-02T19:09:57.300" idx="3">
-    <p:pos x="10" y="10"/>
-    <p:text>1) Add an audio output
-2) Arrows are directional (input from camera, output to display/audio).</p:text>
-    <p:extLst>
-      <p:ext uri="{C676402C-5697-4E1C-873F-D02D1690AC5C}">
-        <p15:threadingInfo xmlns:p15="http://schemas.microsoft.com/office/powerpoint/2012/main" timeZoneBias="240"/>
-      </p:ext>
-    </p:extLst>
-  </p:cm>
-</p:cmLst>
-</file>
-
-<file path=ppt/comments/comment5.xml><?xml version="1.0" encoding="utf-8"?>
 <p:cmLst xmlns:a="http://schemas.openxmlformats.org/drawingml/2006/main" xmlns:r="http://schemas.openxmlformats.org/officeDocument/2006/relationships" xmlns:p="http://schemas.openxmlformats.org/presentationml/2006/main">
   <p:cm authorId="1" dt="2018-09-02T19:09:57.300" idx="3">
     <p:pos x="10" y="10"/>
@@ -13561,27 +13546,7 @@
             </a:pPr>
             <a:r>
               <a:rPr lang="en-US" dirty="0"/>
-              <a:t>Traffic sign recognition</a:t>
-            </a:r>
-          </a:p>
-          <a:p>
-            <a:pPr marL="342900" indent="-342900">
-              <a:buFont typeface="Arial" panose="020B0604020202020204" pitchFamily="34" charset="0"/>
-              <a:buChar char="•"/>
-            </a:pPr>
-            <a:r>
-              <a:rPr lang="en-US" dirty="0"/>
               <a:t>Lane departure detection and warning</a:t>
-            </a:r>
-          </a:p>
-          <a:p>
-            <a:pPr marL="342900" indent="-342900">
-              <a:buFont typeface="Arial" panose="020B0604020202020204" pitchFamily="34" charset="0"/>
-              <a:buChar char="•"/>
-            </a:pPr>
-            <a:r>
-              <a:rPr lang="en-US" dirty="0"/>
-              <a:t>Collision and obstacle avoidance</a:t>
             </a:r>
           </a:p>
         </p:txBody>
@@ -13759,31 +13724,35 @@
           </a:p>
         </p:txBody>
       </p:sp>
-      <p:sp>
-        <p:nvSpPr>
-          <p:cNvPr id="4" name="Content Placeholder 3">
+      <p:pic>
+        <p:nvPicPr>
+          <p:cNvPr id="5" name="Content Placeholder 4">
             <a:extLst>
               <a:ext uri="{FF2B5EF4-FFF2-40B4-BE49-F238E27FC236}">
-                <a16:creationId xmlns:a16="http://schemas.microsoft.com/office/drawing/2014/main" id="{C71EBFAB-BD14-49BD-A20D-DA932FC63CF0}"/>
+                <a16:creationId xmlns:a16="http://schemas.microsoft.com/office/drawing/2014/main" id="{7983F10D-E98E-421A-9A47-150361AF5C07}"/>
               </a:ext>
             </a:extLst>
           </p:cNvPr>
-          <p:cNvSpPr>
-            <a:spLocks noGrp="1"/>
-          </p:cNvSpPr>
+          <p:cNvPicPr>
+            <a:picLocks noGrp="1" noChangeAspect="1"/>
+          </p:cNvPicPr>
           <p:nvPr>
             <p:ph idx="1"/>
           </p:nvPr>
-        </p:nvSpPr>
-        <p:spPr/>
-        <p:txBody>
-          <a:bodyPr/>
-          <a:lstStyle/>
-          <a:p>
-            <a:endParaRPr lang="en-US"/>
-          </a:p>
-        </p:txBody>
-      </p:sp>
+        </p:nvPicPr>
+        <p:blipFill>
+          <a:blip r:embed="rId2"/>
+          <a:stretch>
+            <a:fillRect/>
+          </a:stretch>
+        </p:blipFill>
+        <p:spPr>
+          <a:xfrm>
+            <a:off x="2851150" y="3110706"/>
+            <a:ext cx="6486525" cy="1819275"/>
+          </a:xfrm>
+        </p:spPr>
+      </p:pic>
     </p:spTree>
     <p:extLst>
       <p:ext uri="{BB962C8B-B14F-4D97-AF65-F5344CB8AC3E}">
@@ -13846,31 +13815,35 @@
           </a:p>
         </p:txBody>
       </p:sp>
-      <p:sp>
-        <p:nvSpPr>
-          <p:cNvPr id="4" name="Content Placeholder 3">
+      <p:pic>
+        <p:nvPicPr>
+          <p:cNvPr id="5" name="Content Placeholder 4">
             <a:extLst>
               <a:ext uri="{FF2B5EF4-FFF2-40B4-BE49-F238E27FC236}">
-                <a16:creationId xmlns:a16="http://schemas.microsoft.com/office/drawing/2014/main" id="{C71EBFAB-BD14-49BD-A20D-DA932FC63CF0}"/>
+                <a16:creationId xmlns:a16="http://schemas.microsoft.com/office/drawing/2014/main" id="{70E06390-DCF6-4E1A-B28B-5E382C90D689}"/>
               </a:ext>
             </a:extLst>
           </p:cNvPr>
-          <p:cNvSpPr>
-            <a:spLocks noGrp="1"/>
-          </p:cNvSpPr>
+          <p:cNvPicPr>
+            <a:picLocks noGrp="1" noChangeAspect="1"/>
+          </p:cNvPicPr>
           <p:nvPr>
             <p:ph idx="1"/>
           </p:nvPr>
-        </p:nvSpPr>
-        <p:spPr/>
-        <p:txBody>
-          <a:bodyPr/>
-          <a:lstStyle/>
-          <a:p>
-            <a:endParaRPr lang="en-US"/>
-          </a:p>
-        </p:txBody>
-      </p:sp>
+        </p:nvPicPr>
+        <p:blipFill>
+          <a:blip r:embed="rId2"/>
+          <a:stretch>
+            <a:fillRect/>
+          </a:stretch>
+        </p:blipFill>
+        <p:spPr>
+          <a:xfrm>
+            <a:off x="4327525" y="3039269"/>
+            <a:ext cx="3533775" cy="1962150"/>
+          </a:xfrm>
+        </p:spPr>
+      </p:pic>
     </p:spTree>
     <p:extLst>
       <p:ext uri="{BB962C8B-B14F-4D97-AF65-F5344CB8AC3E}">
@@ -13954,7 +13927,27 @@
           <a:bodyPr/>
           <a:lstStyle/>
           <a:p>
-            <a:endParaRPr lang="en-US"/>
+            <a:pPr lvl="4"/>
+            <a:endParaRPr lang="en-US" dirty="0"/>
+          </a:p>
+          <a:p>
+            <a:pPr lvl="4"/>
+            <a:endParaRPr lang="en-US" dirty="0"/>
+          </a:p>
+          <a:p>
+            <a:pPr lvl="4"/>
+            <a:endParaRPr lang="en-US" dirty="0"/>
+          </a:p>
+          <a:p>
+            <a:pPr lvl="4"/>
+            <a:endParaRPr lang="en-US" dirty="0"/>
+          </a:p>
+          <a:p>
+            <a:pPr lvl="8"/>
+            <a:r>
+              <a:rPr lang="en-US" sz="2000" dirty="0"/>
+              <a:t>TBD</a:t>
+            </a:r>
           </a:p>
         </p:txBody>
       </p:sp>
@@ -14179,7 +14172,7 @@
           <a:p>
             <a:r>
               <a:rPr lang="en-US" dirty="0"/>
-              <a:t>Using an Android Mobile Phone or a Raspberry Pi 3 B+ and a camera module, develop computer vision processing to perform the following functions</a:t>
+              <a:t>Using an Android Mobile Phone, develop computer vision processing to perform the following functions</a:t>
             </a:r>
           </a:p>
           <a:p>
@@ -14192,7 +14185,18 @@
             <a:pPr lvl="1"/>
             <a:r>
               <a:rPr lang="en-US" b="1" u="sng" dirty="0"/>
-              <a:t>Collision and Obstacle Avoidance:</a:t>
+              <a:t>Lane Departure Detection and Warning:</a:t>
+            </a:r>
+            <a:r>
+              <a:rPr lang="en-US" dirty="0"/>
+              <a:t> Determine when the vehicle is departing from its travel lane and warn the operator. Requires recognition of a travel lane.</a:t>
+            </a:r>
+          </a:p>
+          <a:p>
+            <a:pPr lvl="1"/>
+            <a:r>
+              <a:rPr lang="en-US" b="1" u="sng" dirty="0"/>
+              <a:t>DEFERRED: Collision and Obstacle Avoidance:</a:t>
             </a:r>
             <a:r>
               <a:rPr lang="en-US" dirty="0"/>
@@ -14203,22 +14207,11 @@
             <a:pPr lvl="1"/>
             <a:r>
               <a:rPr lang="en-US" b="1" u="sng" dirty="0"/>
-              <a:t>Traffic Sign Recognition:</a:t>
+              <a:t>DEFERRED: Traffic Sign Recognition:</a:t>
             </a:r>
             <a:r>
               <a:rPr lang="en-US" dirty="0"/>
               <a:t> Read traffic signs, most importantly speed limit signs, to determine appropriate driving behavior.</a:t>
-            </a:r>
-          </a:p>
-          <a:p>
-            <a:pPr lvl="1"/>
-            <a:r>
-              <a:rPr lang="en-US" b="1" u="sng" dirty="0"/>
-              <a:t>Lane Departure Detection and Warning:</a:t>
-            </a:r>
-            <a:r>
-              <a:rPr lang="en-US" dirty="0"/>
-              <a:t> Determine when the vehicle is departing from its travel lane and warn the operator. Requires recognition of a travel lane.</a:t>
             </a:r>
           </a:p>
         </p:txBody>
@@ -14652,7 +14645,12 @@
             <p:ph type="title"/>
           </p:nvPr>
         </p:nvSpPr>
-        <p:spPr/>
+        <p:spPr>
+          <a:xfrm>
+            <a:off x="1116361" y="194855"/>
+            <a:ext cx="9905998" cy="994797"/>
+          </a:xfrm>
+        </p:spPr>
         <p:txBody>
           <a:bodyPr/>
           <a:lstStyle/>
@@ -14664,31 +14662,47 @@
           </a:p>
         </p:txBody>
       </p:sp>
-      <p:sp>
-        <p:nvSpPr>
-          <p:cNvPr id="4" name="Content Placeholder 3">
+      <p:pic>
+        <p:nvPicPr>
+          <p:cNvPr id="1026" name="Picture 2" descr="C:\Users\pw53950\Documents\SSW690ProcessArchitecture-Paint.png"/>
+          <p:cNvPicPr>
+            <a:picLocks noChangeAspect="1" noChangeArrowheads="1"/>
+          </p:cNvPicPr>
+          <p:nvPr/>
+        </p:nvPicPr>
+        <p:blipFill>
+          <a:blip r:embed="rId3">
             <a:extLst>
-              <a:ext uri="{FF2B5EF4-FFF2-40B4-BE49-F238E27FC236}">
-                <a16:creationId xmlns:a16="http://schemas.microsoft.com/office/drawing/2014/main" id="{356C8CA0-7FC4-4DDA-8B85-BC21CA2507C1}"/>
+              <a:ext uri="{28A0092B-C50C-407E-A947-70E740481C1C}">
+                <a14:useLocalDpi xmlns:a14="http://schemas.microsoft.com/office/drawing/2010/main" val="0"/>
               </a:ext>
             </a:extLst>
-          </p:cNvPr>
-          <p:cNvSpPr>
-            <a:spLocks noGrp="1"/>
-          </p:cNvSpPr>
-          <p:nvPr>
-            <p:ph idx="1"/>
-          </p:nvPr>
-        </p:nvSpPr>
-        <p:spPr/>
-        <p:txBody>
-          <a:bodyPr/>
-          <a:lstStyle/>
-          <a:p>
-            <a:endParaRPr lang="en-US"/>
-          </a:p>
-        </p:txBody>
-      </p:sp>
+          </a:blip>
+          <a:srcRect/>
+          <a:stretch>
+            <a:fillRect/>
+          </a:stretch>
+        </p:blipFill>
+        <p:spPr bwMode="auto">
+          <a:xfrm>
+            <a:off x="4094361" y="1029914"/>
+            <a:ext cx="4398285" cy="5608880"/>
+          </a:xfrm>
+          <a:prstGeom prst="rect">
+            <a:avLst/>
+          </a:prstGeom>
+          <a:noFill/>
+          <a:extLst>
+            <a:ext uri="{909E8E84-426E-40DD-AFC4-6F175D3DCCD1}">
+              <a14:hiddenFill xmlns:a14="http://schemas.microsoft.com/office/drawing/2010/main">
+                <a:solidFill>
+                  <a:srgbClr val="FFFFFF"/>
+                </a:solidFill>
+              </a14:hiddenFill>
+            </a:ext>
+          </a:extLst>
+        </p:spPr>
+      </p:pic>
     </p:spTree>
     <p:extLst>
       <p:ext uri="{BB962C8B-B14F-4D97-AF65-F5344CB8AC3E}">
@@ -14871,7 +14885,7 @@
         <p:spPr/>
         <p:txBody>
           <a:bodyPr>
-            <a:normAutofit fontScale="85000" lnSpcReduction="20000"/>
+            <a:normAutofit fontScale="70000" lnSpcReduction="20000"/>
           </a:bodyPr>
           <a:lstStyle/>
           <a:p>
@@ -14892,6 +14906,13 @@
             <a:r>
               <a:rPr lang="en-US" dirty="0"/>
               <a:t>Application monitors for lane departure</a:t>
+            </a:r>
+          </a:p>
+          <a:p>
+            <a:pPr lvl="1"/>
+            <a:r>
+              <a:rPr lang="en-US" dirty="0"/>
+              <a:t>Application alerts user when car is close to leaving the lane</a:t>
             </a:r>
           </a:p>
           <a:p>
@@ -14977,7 +14998,7 @@
     </p:spTree>
     <p:extLst>
       <p:ext uri="{BB962C8B-B14F-4D97-AF65-F5344CB8AC3E}">
-        <p14:creationId xmlns:p14="http://schemas.microsoft.com/office/powerpoint/2010/main" val="3373434655"/>
+        <p14:creationId xmlns:p14="http://schemas.microsoft.com/office/powerpoint/2010/main" val="2539559315"/>
       </p:ext>
     </p:extLst>
   </p:cSld>

</xml_diff>